<commit_message>
update to presentation slides
</commit_message>
<xml_diff>
--- a/doc/Iteration0/Iter0_Presentation.pptx
+++ b/doc/Iteration0/Iter0_Presentation.pptx
@@ -8179,7 +8179,7 @@
             </a:pPr>
             <a:r>
               <a:rPr lang="en" sz="2000"/>
-              <a:t>An app to get your prescription, without struggle</a:t>
+              <a:t>An app to get your prescription, without the struggle</a:t>
             </a:r>
             <a:endParaRPr sz="2000"/>
           </a:p>
@@ -9096,7 +9096,7 @@
         <p:spPr>
           <a:xfrm>
             <a:off x="729450" y="2078875"/>
-            <a:ext cx="7688700" cy="2261100"/>
+            <a:ext cx="7688700" cy="3064500"/>
           </a:xfrm>
           <a:prstGeom prst="rect">
             <a:avLst/>
@@ -9104,25 +9104,217 @@
         </p:spPr>
         <p:txBody>
           <a:bodyPr anchorCtr="0" anchor="t" bIns="91425" lIns="91425" spcFirstLastPara="1" rIns="91425" wrap="square" tIns="91425">
-            <a:normAutofit/>
+            <a:normAutofit fontScale="32500"/>
           </a:bodyPr>
           <a:lstStyle/>
           <a:p>
-            <a:pPr indent="-336550" lvl="0" marL="457200" rtl="0" algn="l">
-              <a:spcBef>
-                <a:spcPts val="0"/>
-              </a:spcBef>
-              <a:spcAft>
-                <a:spcPts val="0"/>
-              </a:spcAft>
-              <a:buSzPts val="1700"/>
+            <a:pPr indent="-335915" lvl="0" marL="457200" rtl="0" algn="l">
+              <a:spcBef>
+                <a:spcPts val="0"/>
+              </a:spcBef>
+              <a:spcAft>
+                <a:spcPts val="0"/>
+              </a:spcAft>
+              <a:buSzPct val="100000"/>
               <a:buChar char="-"/>
             </a:pPr>
             <a:r>
-              <a:rPr lang="en" sz="1700"/>
-              <a:t>Some overview</a:t>
+              <a:rPr lang="en" sz="5200">
+                <a:solidFill>
+                  <a:srgbClr val="000000"/>
+                </a:solidFill>
+              </a:rPr>
+              <a:t>Rxcellent is an e-commerce pharmacy website that sells prescription medications. </a:t>
             </a:r>
-            <a:endParaRPr sz="1700"/>
+            <a:endParaRPr sz="5200">
+              <a:solidFill>
+                <a:srgbClr val="000000"/>
+              </a:solidFill>
+            </a:endParaRPr>
+          </a:p>
+          <a:p>
+            <a:pPr indent="-335915" lvl="0" marL="457200" rtl="0" algn="l">
+              <a:spcBef>
+                <a:spcPts val="0"/>
+              </a:spcBef>
+              <a:spcAft>
+                <a:spcPts val="0"/>
+              </a:spcAft>
+              <a:buSzPct val="100000"/>
+              <a:buChar char="-"/>
+            </a:pPr>
+            <a:r>
+              <a:rPr lang="en" sz="5200">
+                <a:solidFill>
+                  <a:srgbClr val="000000"/>
+                </a:solidFill>
+              </a:rPr>
+              <a:t>Purpose :-												</a:t>
+            </a:r>
+            <a:endParaRPr sz="5200">
+              <a:solidFill>
+                <a:srgbClr val="000000"/>
+              </a:solidFill>
+            </a:endParaRPr>
+          </a:p>
+          <a:p>
+            <a:pPr indent="-335915" lvl="0" marL="914400" rtl="0" algn="l">
+              <a:spcBef>
+                <a:spcPts val="0"/>
+              </a:spcBef>
+              <a:spcAft>
+                <a:spcPts val="0"/>
+              </a:spcAft>
+              <a:buClr>
+                <a:srgbClr val="000000"/>
+              </a:buClr>
+              <a:buSzPct val="100000"/>
+              <a:buChar char="●"/>
+            </a:pPr>
+            <a:r>
+              <a:rPr lang="en" sz="5200">
+                <a:solidFill>
+                  <a:srgbClr val="000000"/>
+                </a:solidFill>
+              </a:rPr>
+              <a:t>The motivation is to sell medicine to cut out the middleman directly to  sick  adults and teens with prescriptions without them having to go to a brick and mortar pharmacy.</a:t>
+            </a:r>
+            <a:endParaRPr sz="5200">
+              <a:solidFill>
+                <a:srgbClr val="000000"/>
+              </a:solidFill>
+            </a:endParaRPr>
+          </a:p>
+          <a:p>
+            <a:pPr indent="-335915" lvl="0" marL="457200" rtl="0" algn="l">
+              <a:spcBef>
+                <a:spcPts val="0"/>
+              </a:spcBef>
+              <a:spcAft>
+                <a:spcPts val="0"/>
+              </a:spcAft>
+              <a:buClr>
+                <a:srgbClr val="000000"/>
+              </a:buClr>
+              <a:buSzPct val="100000"/>
+              <a:buChar char="-"/>
+            </a:pPr>
+            <a:r>
+              <a:rPr lang="en" sz="5200">
+                <a:solidFill>
+                  <a:srgbClr val="000000"/>
+                </a:solidFill>
+              </a:rPr>
+              <a:t>Users:</a:t>
+            </a:r>
+            <a:endParaRPr sz="5200">
+              <a:solidFill>
+                <a:srgbClr val="000000"/>
+              </a:solidFill>
+            </a:endParaRPr>
+          </a:p>
+          <a:p>
+            <a:pPr indent="-335915" lvl="0" marL="914400" rtl="0" algn="l">
+              <a:spcBef>
+                <a:spcPts val="0"/>
+              </a:spcBef>
+              <a:spcAft>
+                <a:spcPts val="0"/>
+              </a:spcAft>
+              <a:buClr>
+                <a:srgbClr val="000000"/>
+              </a:buClr>
+              <a:buSzPct val="100000"/>
+              <a:buChar char="●"/>
+            </a:pPr>
+            <a:r>
+              <a:rPr lang="en" sz="5200">
+                <a:solidFill>
+                  <a:srgbClr val="000000"/>
+                </a:solidFill>
+              </a:rPr>
+              <a:t>Anyone with a prescription within valid date of medication.</a:t>
+            </a:r>
+            <a:endParaRPr sz="5200">
+              <a:solidFill>
+                <a:srgbClr val="000000"/>
+              </a:solidFill>
+            </a:endParaRPr>
+          </a:p>
+          <a:p>
+            <a:pPr indent="0" lvl="0" marL="0" rtl="0" algn="l">
+              <a:spcBef>
+                <a:spcPts val="0"/>
+              </a:spcBef>
+              <a:spcAft>
+                <a:spcPts val="0"/>
+              </a:spcAft>
+              <a:buNone/>
+            </a:pPr>
+            <a:r>
+              <a:rPr lang="en" sz="1700">
+                <a:solidFill>
+                  <a:srgbClr val="000000"/>
+                </a:solidFill>
+              </a:rPr>
+              <a:t>    </a:t>
+            </a:r>
+            <a:endParaRPr sz="1700">
+              <a:solidFill>
+                <a:srgbClr val="000000"/>
+              </a:solidFill>
+            </a:endParaRPr>
+          </a:p>
+          <a:p>
+            <a:pPr indent="0" lvl="0" marL="457200" rtl="0" algn="l">
+              <a:spcBef>
+                <a:spcPts val="0"/>
+              </a:spcBef>
+              <a:spcAft>
+                <a:spcPts val="0"/>
+              </a:spcAft>
+              <a:buNone/>
+            </a:pPr>
+            <a:r>
+              <a:t/>
+            </a:r>
+            <a:endParaRPr sz="1700">
+              <a:solidFill>
+                <a:srgbClr val="000000"/>
+              </a:solidFill>
+            </a:endParaRPr>
+          </a:p>
+          <a:p>
+            <a:pPr indent="0" lvl="0" marL="457200" rtl="0" algn="l">
+              <a:spcBef>
+                <a:spcPts val="0"/>
+              </a:spcBef>
+              <a:spcAft>
+                <a:spcPts val="0"/>
+              </a:spcAft>
+              <a:buNone/>
+            </a:pPr>
+            <a:r>
+              <a:rPr lang="en" sz="1100">
+                <a:solidFill>
+                  <a:srgbClr val="000000"/>
+                </a:solidFill>
+                <a:latin typeface="Arial"/>
+                <a:ea typeface="Arial"/>
+                <a:cs typeface="Arial"/>
+                <a:sym typeface="Arial"/>
+              </a:rPr>
+              <a:t> </a:t>
+            </a:r>
+            <a:endParaRPr sz="1100">
+              <a:solidFill>
+                <a:srgbClr val="000000"/>
+              </a:solidFill>
+              <a:latin typeface="Arial"/>
+              <a:ea typeface="Arial"/>
+              <a:cs typeface="Arial"/>
+              <a:sym typeface="Arial"/>
+            </a:endParaRPr>
           </a:p>
         </p:txBody>
       </p:sp>
@@ -9203,7 +9395,7 @@
         <p:spPr>
           <a:xfrm>
             <a:off x="729450" y="2078875"/>
-            <a:ext cx="7688700" cy="2261100"/>
+            <a:ext cx="7688700" cy="3001800"/>
           </a:xfrm>
           <a:prstGeom prst="rect">
             <a:avLst/>
@@ -9211,7 +9403,7 @@
         </p:spPr>
         <p:txBody>
           <a:bodyPr anchorCtr="0" anchor="t" bIns="91425" lIns="91425" spcFirstLastPara="1" rIns="91425" wrap="square" tIns="91425">
-            <a:normAutofit/>
+            <a:noAutofit/>
           </a:bodyPr>
           <a:lstStyle/>
           <a:p>
@@ -9227,9 +9419,109 @@
             </a:pPr>
             <a:r>
               <a:rPr lang="en" sz="1700"/>
-              <a:t>Requirements</a:t>
+              <a:t>As a user i should be able to order medicine so that i dont have to walk to store to get medicine.</a:t>
             </a:r>
             <a:endParaRPr sz="1700"/>
+          </a:p>
+          <a:p>
+            <a:pPr indent="-336550" lvl="0" marL="457200" rtl="0" algn="l">
+              <a:spcBef>
+                <a:spcPts val="0"/>
+              </a:spcBef>
+              <a:spcAft>
+                <a:spcPts val="0"/>
+              </a:spcAft>
+              <a:buClr>
+                <a:srgbClr val="000000"/>
+              </a:buClr>
+              <a:buSzPts val="1700"/>
+              <a:buChar char="-"/>
+            </a:pPr>
+            <a:r>
+              <a:rPr lang="en" sz="1700">
+                <a:solidFill>
+                  <a:srgbClr val="000000"/>
+                </a:solidFill>
+              </a:rPr>
+              <a:t>As a person with a need for prescription medicine, I want to be able to order prescriptions online so that I always have them in reserve.</a:t>
+            </a:r>
+            <a:endParaRPr sz="1700">
+              <a:solidFill>
+                <a:srgbClr val="000000"/>
+              </a:solidFill>
+            </a:endParaRPr>
+          </a:p>
+          <a:p>
+            <a:pPr indent="-336550" lvl="0" marL="457200" rtl="0" algn="l">
+              <a:spcBef>
+                <a:spcPts val="0"/>
+              </a:spcBef>
+              <a:spcAft>
+                <a:spcPts val="0"/>
+              </a:spcAft>
+              <a:buSzPts val="1700"/>
+              <a:buChar char="-"/>
+            </a:pPr>
+            <a:r>
+              <a:rPr lang="en" sz="1700">
+                <a:solidFill>
+                  <a:srgbClr val="000000"/>
+                </a:solidFill>
+              </a:rPr>
+              <a:t>As a hospital worker, I want users to be registered before buying prescription medicine so that we’re not selling medicine to people that don’t deserve it.</a:t>
+            </a:r>
+            <a:endParaRPr sz="1700">
+              <a:solidFill>
+                <a:srgbClr val="000000"/>
+              </a:solidFill>
+            </a:endParaRPr>
+          </a:p>
+          <a:p>
+            <a:pPr indent="-336550" lvl="0" marL="457200" rtl="0" algn="l">
+              <a:spcBef>
+                <a:spcPts val="0"/>
+              </a:spcBef>
+              <a:spcAft>
+                <a:spcPts val="0"/>
+              </a:spcAft>
+              <a:buClr>
+                <a:srgbClr val="000000"/>
+              </a:buClr>
+              <a:buSzPts val="1700"/>
+              <a:buChar char="-"/>
+            </a:pPr>
+            <a:r>
+              <a:rPr lang="en" sz="1700">
+                <a:solidFill>
+                  <a:srgbClr val="000000"/>
+                </a:solidFill>
+              </a:rPr>
+              <a:t>As a hospital worker, I want to have an administration panel so that I can accept or reject the users, depending on the prescription condition.</a:t>
+            </a:r>
+            <a:endParaRPr sz="1700">
+              <a:solidFill>
+                <a:srgbClr val="000000"/>
+              </a:solidFill>
+            </a:endParaRPr>
+          </a:p>
+          <a:p>
+            <a:pPr indent="0" lvl="0" marL="457200" rtl="0" algn="l">
+              <a:spcBef>
+                <a:spcPts val="0"/>
+              </a:spcBef>
+              <a:spcAft>
+                <a:spcPts val="0"/>
+              </a:spcAft>
+              <a:buNone/>
+            </a:pPr>
+            <a:r>
+              <a:t/>
+            </a:r>
+            <a:endParaRPr sz="1700">
+              <a:solidFill>
+                <a:srgbClr val="000000"/>
+              </a:solidFill>
+            </a:endParaRPr>
           </a:p>
         </p:txBody>
       </p:sp>
@@ -9268,8 +9560,8 @@
         </p:nvSpPr>
         <p:spPr>
           <a:xfrm>
-            <a:off x="729450" y="1318650"/>
-            <a:ext cx="7688700" cy="535200"/>
+            <a:off x="727650" y="1352525"/>
+            <a:ext cx="7688700" cy="391200"/>
           </a:xfrm>
           <a:prstGeom prst="rect">
             <a:avLst/>
@@ -9309,8 +9601,8 @@
         </p:nvSpPr>
         <p:spPr>
           <a:xfrm>
-            <a:off x="729450" y="2078875"/>
-            <a:ext cx="7688700" cy="2261100"/>
+            <a:off x="619325" y="1853850"/>
+            <a:ext cx="7688700" cy="2954400"/>
           </a:xfrm>
           <a:prstGeom prst="rect">
             <a:avLst/>
@@ -9318,7 +9610,7 @@
         </p:spPr>
         <p:txBody>
           <a:bodyPr anchorCtr="0" anchor="t" bIns="91425" lIns="91425" spcFirstLastPara="1" rIns="91425" wrap="square" tIns="91425">
-            <a:normAutofit/>
+            <a:noAutofit/>
           </a:bodyPr>
           <a:lstStyle/>
           <a:p>
@@ -9333,8 +9625,165 @@
               <a:buChar char="-"/>
             </a:pPr>
             <a:r>
-              <a:rPr lang="en" sz="1700"/>
-              <a:t>Management plan</a:t>
+              <a:rPr lang="en" sz="1700">
+                <a:solidFill>
+                  <a:srgbClr val="000000"/>
+                </a:solidFill>
+              </a:rPr>
+              <a:t>High priority is to deploy the software successfully with little to no bugs, and maintain high quality.</a:t>
+            </a:r>
+            <a:endParaRPr sz="1700">
+              <a:solidFill>
+                <a:srgbClr val="000000"/>
+              </a:solidFill>
+            </a:endParaRPr>
+          </a:p>
+          <a:p>
+            <a:pPr indent="-336550" lvl="0" marL="457200" rtl="0" algn="l">
+              <a:spcBef>
+                <a:spcPts val="0"/>
+              </a:spcBef>
+              <a:spcAft>
+                <a:spcPts val="0"/>
+              </a:spcAft>
+              <a:buSzPts val="1700"/>
+              <a:buChar char="-"/>
+            </a:pPr>
+            <a:r>
+              <a:rPr lang="en" sz="1700">
+                <a:solidFill>
+                  <a:srgbClr val="000000"/>
+                </a:solidFill>
+              </a:rPr>
+              <a:t>In this project, we will use Git and Github as the version control tools. </a:t>
+            </a:r>
+            <a:endParaRPr sz="1700">
+              <a:solidFill>
+                <a:srgbClr val="000000"/>
+              </a:solidFill>
+            </a:endParaRPr>
+          </a:p>
+          <a:p>
+            <a:pPr indent="-336550" lvl="0" marL="457200" rtl="0" algn="l">
+              <a:spcBef>
+                <a:spcPts val="0"/>
+              </a:spcBef>
+              <a:spcAft>
+                <a:spcPts val="0"/>
+              </a:spcAft>
+              <a:buSzPts val="1700"/>
+              <a:buChar char="-"/>
+            </a:pPr>
+            <a:r>
+              <a:rPr lang="en" sz="1700">
+                <a:solidFill>
+                  <a:srgbClr val="000000"/>
+                </a:solidFill>
+              </a:rPr>
+              <a:t>We are going to use VS Code as IDE; Husky for pre-commit lint check; Vercel as the first choice for deployment and Heroku as a backup.</a:t>
+            </a:r>
+            <a:endParaRPr sz="1700">
+              <a:solidFill>
+                <a:srgbClr val="000000"/>
+              </a:solidFill>
+            </a:endParaRPr>
+          </a:p>
+          <a:p>
+            <a:pPr indent="-336550" lvl="0" marL="457200" rtl="0" algn="l">
+              <a:lnSpc>
+                <a:spcPct val="115000"/>
+              </a:lnSpc>
+              <a:spcBef>
+                <a:spcPts val="0"/>
+              </a:spcBef>
+              <a:spcAft>
+                <a:spcPts val="0"/>
+              </a:spcAft>
+              <a:buSzPts val="1700"/>
+              <a:buChar char="-"/>
+            </a:pPr>
+            <a:r>
+              <a:rPr lang="en" sz="1700">
+                <a:solidFill>
+                  <a:srgbClr val="424242"/>
+                </a:solidFill>
+              </a:rPr>
+              <a:t>Each iteration will begin by reviewing the previous iteration and using that to plan out the next</a:t>
+            </a:r>
+            <a:endParaRPr sz="1700">
+              <a:solidFill>
+                <a:srgbClr val="424242"/>
+              </a:solidFill>
+            </a:endParaRPr>
+          </a:p>
+          <a:p>
+            <a:pPr indent="-336550" lvl="0" marL="457200" rtl="0" algn="l">
+              <a:lnSpc>
+                <a:spcPct val="115000"/>
+              </a:lnSpc>
+              <a:spcBef>
+                <a:spcPts val="0"/>
+              </a:spcBef>
+              <a:spcAft>
+                <a:spcPts val="0"/>
+              </a:spcAft>
+              <a:buSzPts val="1700"/>
+              <a:buChar char="-"/>
+            </a:pPr>
+            <a:r>
+              <a:rPr lang="en" sz="1700">
+                <a:solidFill>
+                  <a:srgbClr val="424242"/>
+                </a:solidFill>
+              </a:rPr>
+              <a:t>Each week goals will be reviewed and tasks assigned to appropriate parties</a:t>
+            </a:r>
+            <a:endParaRPr sz="1700">
+              <a:solidFill>
+                <a:srgbClr val="424242"/>
+              </a:solidFill>
+            </a:endParaRPr>
+          </a:p>
+          <a:p>
+            <a:pPr indent="-336550" lvl="0" marL="457200" rtl="0" algn="l">
+              <a:lnSpc>
+                <a:spcPct val="115000"/>
+              </a:lnSpc>
+              <a:spcBef>
+                <a:spcPts val="0"/>
+              </a:spcBef>
+              <a:spcAft>
+                <a:spcPts val="0"/>
+              </a:spcAft>
+              <a:buSzPts val="1700"/>
+              <a:buChar char="-"/>
+            </a:pPr>
+            <a:r>
+              <a:rPr lang="en" sz="1700">
+                <a:solidFill>
+                  <a:srgbClr val="424242"/>
+                </a:solidFill>
+              </a:rPr>
+              <a:t>At the end of each iteration a review will assess the completed work to discuss / deal with any encountered problems or risks.</a:t>
+            </a:r>
+            <a:endParaRPr sz="1700">
+              <a:solidFill>
+                <a:srgbClr val="424242"/>
+              </a:solidFill>
+            </a:endParaRPr>
+          </a:p>
+          <a:p>
+            <a:pPr indent="0" lvl="0" marL="457200" rtl="0" algn="l">
+              <a:spcBef>
+                <a:spcPts val="0"/>
+              </a:spcBef>
+              <a:spcAft>
+                <a:spcPts val="1200"/>
+              </a:spcAft>
+              <a:buNone/>
+            </a:pPr>
+            <a:r>
+              <a:t/>
             </a:r>
             <a:endParaRPr sz="1700"/>
           </a:p>
@@ -9867,7 +10316,7 @@
             <a:tbl>
               <a:tblPr>
                 <a:noFill/>
-                <a:tableStyleId>{C05CB109-AC80-4848-B23E-8913D71796B5}</a:tableStyleId>
+                <a:tableStyleId>{6F8146C0-4707-4EF0-B88E-27D1AD5E97A2}</a:tableStyleId>
               </a:tblPr>
               <a:tblGrid>
                 <a:gridCol w="1171575"/>

</xml_diff>